<commit_message>
working on a write up
</commit_message>
<xml_diff>
--- a/apps/dataflow/doc/figures.pptx
+++ b/apps/dataflow/doc/figures.pptx
@@ -6,6 +6,7 @@
   </p:sldMasterIdLst>
   <p:sldIdLst>
     <p:sldId id="256" r:id="rId2"/>
+    <p:sldId id="257" r:id="rId3"/>
   </p:sldIdLst>
   <p:sldSz cx="12192000" cy="6858000"/>
   <p:notesSz cx="6858000" cy="9144000"/>
@@ -104,6 +105,11 @@
       </a:defRPr>
     </a:lvl9pPr>
   </p:defaultTextStyle>
+  <p:extLst>
+    <p:ext uri="{EFAFB233-063F-42B5-8137-9DF3F51BA10A}">
+      <p15:sldGuideLst xmlns:p15="http://schemas.microsoft.com/office/powerpoint/2012/main"/>
+    </p:ext>
+  </p:extLst>
 </p:presentation>
 </file>
 
@@ -254,7 +260,7 @@
           <a:p>
             <a:fld id="{D5DC08E7-7908-B843-9923-2CD2B5FC43F5}" type="datetimeFigureOut">
               <a:rPr lang="en-US" smtClean="0"/>
-              <a:t>10/13/22</a:t>
+              <a:t>10/16/22</a:t>
             </a:fld>
             <a:endParaRPr lang="en-US"/>
           </a:p>
@@ -452,7 +458,7 @@
           <a:p>
             <a:fld id="{D5DC08E7-7908-B843-9923-2CD2B5FC43F5}" type="datetimeFigureOut">
               <a:rPr lang="en-US" smtClean="0"/>
-              <a:t>10/13/22</a:t>
+              <a:t>10/16/22</a:t>
             </a:fld>
             <a:endParaRPr lang="en-US"/>
           </a:p>
@@ -660,7 +666,7 @@
           <a:p>
             <a:fld id="{D5DC08E7-7908-B843-9923-2CD2B5FC43F5}" type="datetimeFigureOut">
               <a:rPr lang="en-US" smtClean="0"/>
-              <a:t>10/13/22</a:t>
+              <a:t>10/16/22</a:t>
             </a:fld>
             <a:endParaRPr lang="en-US"/>
           </a:p>
@@ -858,7 +864,7 @@
           <a:p>
             <a:fld id="{D5DC08E7-7908-B843-9923-2CD2B5FC43F5}" type="datetimeFigureOut">
               <a:rPr lang="en-US" smtClean="0"/>
-              <a:t>10/13/22</a:t>
+              <a:t>10/16/22</a:t>
             </a:fld>
             <a:endParaRPr lang="en-US"/>
           </a:p>
@@ -1133,7 +1139,7 @@
           <a:p>
             <a:fld id="{D5DC08E7-7908-B843-9923-2CD2B5FC43F5}" type="datetimeFigureOut">
               <a:rPr lang="en-US" smtClean="0"/>
-              <a:t>10/13/22</a:t>
+              <a:t>10/16/22</a:t>
             </a:fld>
             <a:endParaRPr lang="en-US"/>
           </a:p>
@@ -1398,7 +1404,7 @@
           <a:p>
             <a:fld id="{D5DC08E7-7908-B843-9923-2CD2B5FC43F5}" type="datetimeFigureOut">
               <a:rPr lang="en-US" smtClean="0"/>
-              <a:t>10/13/22</a:t>
+              <a:t>10/16/22</a:t>
             </a:fld>
             <a:endParaRPr lang="en-US"/>
           </a:p>
@@ -1810,7 +1816,7 @@
           <a:p>
             <a:fld id="{D5DC08E7-7908-B843-9923-2CD2B5FC43F5}" type="datetimeFigureOut">
               <a:rPr lang="en-US" smtClean="0"/>
-              <a:t>10/13/22</a:t>
+              <a:t>10/16/22</a:t>
             </a:fld>
             <a:endParaRPr lang="en-US"/>
           </a:p>
@@ -1951,7 +1957,7 @@
           <a:p>
             <a:fld id="{D5DC08E7-7908-B843-9923-2CD2B5FC43F5}" type="datetimeFigureOut">
               <a:rPr lang="en-US" smtClean="0"/>
-              <a:t>10/13/22</a:t>
+              <a:t>10/16/22</a:t>
             </a:fld>
             <a:endParaRPr lang="en-US"/>
           </a:p>
@@ -2064,7 +2070,7 @@
           <a:p>
             <a:fld id="{D5DC08E7-7908-B843-9923-2CD2B5FC43F5}" type="datetimeFigureOut">
               <a:rPr lang="en-US" smtClean="0"/>
-              <a:t>10/13/22</a:t>
+              <a:t>10/16/22</a:t>
             </a:fld>
             <a:endParaRPr lang="en-US"/>
           </a:p>
@@ -2375,7 +2381,7 @@
           <a:p>
             <a:fld id="{D5DC08E7-7908-B843-9923-2CD2B5FC43F5}" type="datetimeFigureOut">
               <a:rPr lang="en-US" smtClean="0"/>
-              <a:t>10/13/22</a:t>
+              <a:t>10/16/22</a:t>
             </a:fld>
             <a:endParaRPr lang="en-US"/>
           </a:p>
@@ -2663,7 +2669,7 @@
           <a:p>
             <a:fld id="{D5DC08E7-7908-B843-9923-2CD2B5FC43F5}" type="datetimeFigureOut">
               <a:rPr lang="en-US" smtClean="0"/>
-              <a:t>10/13/22</a:t>
+              <a:t>10/16/22</a:t>
             </a:fld>
             <a:endParaRPr lang="en-US"/>
           </a:p>
@@ -2904,7 +2910,7 @@
           <a:p>
             <a:fld id="{D5DC08E7-7908-B843-9923-2CD2B5FC43F5}" type="datetimeFigureOut">
               <a:rPr lang="en-US" smtClean="0"/>
-              <a:t>10/13/22</a:t>
+              <a:t>10/16/22</a:t>
             </a:fld>
             <a:endParaRPr lang="en-US"/>
           </a:p>
@@ -3986,6 +3992,1616 @@
 </p:sld>
 </file>
 
+<file path=ppt/slides/slide2.xml><?xml version="1.0" encoding="utf-8"?>
+<p:sld xmlns:a="http://schemas.openxmlformats.org/drawingml/2006/main" xmlns:r="http://schemas.openxmlformats.org/officeDocument/2006/relationships" xmlns:p="http://schemas.openxmlformats.org/presentationml/2006/main">
+  <p:cSld>
+    <p:spTree>
+      <p:nvGrpSpPr>
+        <p:cNvPr id="1" name=""/>
+        <p:cNvGrpSpPr/>
+        <p:nvPr/>
+      </p:nvGrpSpPr>
+      <p:grpSpPr>
+        <a:xfrm>
+          <a:off x="0" y="0"/>
+          <a:ext cx="0" cy="0"/>
+          <a:chOff x="0" y="0"/>
+          <a:chExt cx="0" cy="0"/>
+        </a:xfrm>
+      </p:grpSpPr>
+      <p:sp>
+        <p:nvSpPr>
+          <p:cNvPr id="4" name="Oval 3">
+            <a:extLst>
+              <a:ext uri="{FF2B5EF4-FFF2-40B4-BE49-F238E27FC236}">
+                <a16:creationId xmlns:a16="http://schemas.microsoft.com/office/drawing/2014/main" id="{CE7319B1-5399-1284-294E-94FC6FF4F53A}"/>
+              </a:ext>
+            </a:extLst>
+          </p:cNvPr>
+          <p:cNvSpPr/>
+          <p:nvPr/>
+        </p:nvSpPr>
+        <p:spPr>
+          <a:xfrm>
+            <a:off x="5372099" y="5214264"/>
+            <a:ext cx="1447801" cy="674914"/>
+          </a:xfrm>
+          <a:prstGeom prst="ellipse">
+            <a:avLst/>
+          </a:prstGeom>
+        </p:spPr>
+        <p:style>
+          <a:lnRef idx="2">
+            <a:schemeClr val="accent1">
+              <a:shade val="50000"/>
+            </a:schemeClr>
+          </a:lnRef>
+          <a:fillRef idx="1">
+            <a:schemeClr val="accent1"/>
+          </a:fillRef>
+          <a:effectRef idx="0">
+            <a:schemeClr val="accent1"/>
+          </a:effectRef>
+          <a:fontRef idx="minor">
+            <a:schemeClr val="lt1"/>
+          </a:fontRef>
+        </p:style>
+        <p:txBody>
+          <a:bodyPr rtlCol="0" anchor="ctr"/>
+          <a:lstStyle/>
+          <a:p>
+            <a:pPr algn="ctr"/>
+            <a:r>
+              <a:rPr lang="en-US" dirty="0"/>
+              <a:t>Node 1</a:t>
+            </a:r>
+          </a:p>
+          <a:p>
+            <a:pPr algn="ctr"/>
+            <a:r>
+              <a:rPr lang="en-US" dirty="0"/>
+              <a:t>DIV</a:t>
+            </a:r>
+          </a:p>
+        </p:txBody>
+      </p:sp>
+      <p:cxnSp>
+        <p:nvCxnSpPr>
+          <p:cNvPr id="6" name="Straight Arrow Connector 5">
+            <a:extLst>
+              <a:ext uri="{FF2B5EF4-FFF2-40B4-BE49-F238E27FC236}">
+                <a16:creationId xmlns:a16="http://schemas.microsoft.com/office/drawing/2014/main" id="{A9D5E008-7570-B0D5-8CF2-A098ACC4A9A0}"/>
+              </a:ext>
+            </a:extLst>
+          </p:cNvPr>
+          <p:cNvCxnSpPr>
+            <a:stCxn id="4" idx="4"/>
+          </p:cNvCxnSpPr>
+          <p:nvPr/>
+        </p:nvCxnSpPr>
+        <p:spPr>
+          <a:xfrm>
+            <a:off x="6096000" y="5889178"/>
+            <a:ext cx="5443" cy="555172"/>
+          </a:xfrm>
+          <a:prstGeom prst="straightConnector1">
+            <a:avLst/>
+          </a:prstGeom>
+          <a:ln w="38100">
+            <a:tailEnd type="triangle"/>
+          </a:ln>
+        </p:spPr>
+        <p:style>
+          <a:lnRef idx="1">
+            <a:schemeClr val="accent1"/>
+          </a:lnRef>
+          <a:fillRef idx="0">
+            <a:schemeClr val="accent1"/>
+          </a:fillRef>
+          <a:effectRef idx="0">
+            <a:schemeClr val="accent1"/>
+          </a:effectRef>
+          <a:fontRef idx="minor">
+            <a:schemeClr val="tx1"/>
+          </a:fontRef>
+        </p:style>
+      </p:cxnSp>
+      <p:sp>
+        <p:nvSpPr>
+          <p:cNvPr id="7" name="TextBox 6">
+            <a:extLst>
+              <a:ext uri="{FF2B5EF4-FFF2-40B4-BE49-F238E27FC236}">
+                <a16:creationId xmlns:a16="http://schemas.microsoft.com/office/drawing/2014/main" id="{CC91125E-AAEC-B076-6A23-173ED94134AF}"/>
+              </a:ext>
+            </a:extLst>
+          </p:cNvPr>
+          <p:cNvSpPr txBox="1"/>
+          <p:nvPr/>
+        </p:nvSpPr>
+        <p:spPr>
+          <a:xfrm>
+            <a:off x="5714741" y="6444350"/>
+            <a:ext cx="762516" cy="369332"/>
+          </a:xfrm>
+          <a:prstGeom prst="rect">
+            <a:avLst/>
+          </a:prstGeom>
+          <a:noFill/>
+        </p:spPr>
+        <p:txBody>
+          <a:bodyPr wrap="none" rtlCol="0">
+            <a:spAutoFit/>
+          </a:bodyPr>
+          <a:lstStyle/>
+          <a:p>
+            <a:r>
+              <a:rPr lang="en-US" dirty="0"/>
+              <a:t>Result</a:t>
+            </a:r>
+          </a:p>
+        </p:txBody>
+      </p:sp>
+      <p:sp>
+        <p:nvSpPr>
+          <p:cNvPr id="10" name="Oval 9">
+            <a:extLst>
+              <a:ext uri="{FF2B5EF4-FFF2-40B4-BE49-F238E27FC236}">
+                <a16:creationId xmlns:a16="http://schemas.microsoft.com/office/drawing/2014/main" id="{0203DA99-7471-BF50-60AD-0CEB6520F9B9}"/>
+              </a:ext>
+            </a:extLst>
+          </p:cNvPr>
+          <p:cNvSpPr/>
+          <p:nvPr/>
+        </p:nvSpPr>
+        <p:spPr>
+          <a:xfrm>
+            <a:off x="848826" y="4332521"/>
+            <a:ext cx="1447801" cy="674914"/>
+          </a:xfrm>
+          <a:prstGeom prst="ellipse">
+            <a:avLst/>
+          </a:prstGeom>
+        </p:spPr>
+        <p:style>
+          <a:lnRef idx="2">
+            <a:schemeClr val="accent1">
+              <a:shade val="50000"/>
+            </a:schemeClr>
+          </a:lnRef>
+          <a:fillRef idx="1">
+            <a:schemeClr val="accent1"/>
+          </a:fillRef>
+          <a:effectRef idx="0">
+            <a:schemeClr val="accent1"/>
+          </a:effectRef>
+          <a:fontRef idx="minor">
+            <a:schemeClr val="lt1"/>
+          </a:fontRef>
+        </p:style>
+        <p:txBody>
+          <a:bodyPr rtlCol="0" anchor="ctr"/>
+          <a:lstStyle/>
+          <a:p>
+            <a:pPr algn="ctr"/>
+            <a:r>
+              <a:rPr lang="en-US" dirty="0"/>
+              <a:t>Node 2</a:t>
+            </a:r>
+          </a:p>
+          <a:p>
+            <a:pPr algn="ctr"/>
+            <a:r>
+              <a:rPr lang="en-US" dirty="0"/>
+              <a:t>MUL</a:t>
+            </a:r>
+          </a:p>
+        </p:txBody>
+      </p:sp>
+      <p:sp>
+        <p:nvSpPr>
+          <p:cNvPr id="11" name="Oval 10">
+            <a:extLst>
+              <a:ext uri="{FF2B5EF4-FFF2-40B4-BE49-F238E27FC236}">
+                <a16:creationId xmlns:a16="http://schemas.microsoft.com/office/drawing/2014/main" id="{160F5F65-7463-33A7-E678-954EBF269953}"/>
+              </a:ext>
+            </a:extLst>
+          </p:cNvPr>
+          <p:cNvSpPr/>
+          <p:nvPr/>
+        </p:nvSpPr>
+        <p:spPr>
+          <a:xfrm>
+            <a:off x="6477257" y="4332521"/>
+            <a:ext cx="1447801" cy="674914"/>
+          </a:xfrm>
+          <a:prstGeom prst="ellipse">
+            <a:avLst/>
+          </a:prstGeom>
+        </p:spPr>
+        <p:style>
+          <a:lnRef idx="2">
+            <a:schemeClr val="accent1">
+              <a:shade val="50000"/>
+            </a:schemeClr>
+          </a:lnRef>
+          <a:fillRef idx="1">
+            <a:schemeClr val="accent1"/>
+          </a:fillRef>
+          <a:effectRef idx="0">
+            <a:schemeClr val="accent1"/>
+          </a:effectRef>
+          <a:fontRef idx="minor">
+            <a:schemeClr val="lt1"/>
+          </a:fontRef>
+        </p:style>
+        <p:txBody>
+          <a:bodyPr rtlCol="0" anchor="ctr"/>
+          <a:lstStyle/>
+          <a:p>
+            <a:pPr algn="ctr"/>
+            <a:r>
+              <a:rPr lang="en-US" dirty="0"/>
+              <a:t>Node 4</a:t>
+            </a:r>
+          </a:p>
+          <a:p>
+            <a:pPr algn="ctr"/>
+            <a:r>
+              <a:rPr lang="en-US" dirty="0"/>
+              <a:t>ADD (1)</a:t>
+            </a:r>
+          </a:p>
+        </p:txBody>
+      </p:sp>
+      <p:cxnSp>
+        <p:nvCxnSpPr>
+          <p:cNvPr id="12" name="Straight Arrow Connector 11">
+            <a:extLst>
+              <a:ext uri="{FF2B5EF4-FFF2-40B4-BE49-F238E27FC236}">
+                <a16:creationId xmlns:a16="http://schemas.microsoft.com/office/drawing/2014/main" id="{606E3E4A-6129-50B3-72B3-971FDC96AA16}"/>
+              </a:ext>
+            </a:extLst>
+          </p:cNvPr>
+          <p:cNvCxnSpPr>
+            <a:cxnSpLocks/>
+            <a:endCxn id="4" idx="7"/>
+          </p:cNvCxnSpPr>
+          <p:nvPr/>
+        </p:nvCxnSpPr>
+        <p:spPr>
+          <a:xfrm flipH="1">
+            <a:off x="6607874" y="5007435"/>
+            <a:ext cx="631511" cy="305668"/>
+          </a:xfrm>
+          <a:prstGeom prst="straightConnector1">
+            <a:avLst/>
+          </a:prstGeom>
+          <a:ln w="38100">
+            <a:tailEnd type="triangle"/>
+          </a:ln>
+        </p:spPr>
+        <p:style>
+          <a:lnRef idx="1">
+            <a:schemeClr val="accent1"/>
+          </a:lnRef>
+          <a:fillRef idx="0">
+            <a:schemeClr val="accent1"/>
+          </a:fillRef>
+          <a:effectRef idx="0">
+            <a:schemeClr val="accent1"/>
+          </a:effectRef>
+          <a:fontRef idx="minor">
+            <a:schemeClr val="tx1"/>
+          </a:fontRef>
+        </p:style>
+      </p:cxnSp>
+      <p:cxnSp>
+        <p:nvCxnSpPr>
+          <p:cNvPr id="14" name="Straight Arrow Connector 13">
+            <a:extLst>
+              <a:ext uri="{FF2B5EF4-FFF2-40B4-BE49-F238E27FC236}">
+                <a16:creationId xmlns:a16="http://schemas.microsoft.com/office/drawing/2014/main" id="{61061800-2BD8-828E-011B-05D0B8A7B61B}"/>
+              </a:ext>
+            </a:extLst>
+          </p:cNvPr>
+          <p:cNvCxnSpPr>
+            <a:cxnSpLocks/>
+            <a:stCxn id="10" idx="4"/>
+            <a:endCxn id="4" idx="1"/>
+          </p:cNvCxnSpPr>
+          <p:nvPr/>
+        </p:nvCxnSpPr>
+        <p:spPr>
+          <a:xfrm>
+            <a:off x="1572727" y="5007435"/>
+            <a:ext cx="4011398" cy="305668"/>
+          </a:xfrm>
+          <a:prstGeom prst="straightConnector1">
+            <a:avLst/>
+          </a:prstGeom>
+          <a:ln w="38100">
+            <a:tailEnd type="triangle"/>
+          </a:ln>
+        </p:spPr>
+        <p:style>
+          <a:lnRef idx="1">
+            <a:schemeClr val="accent1"/>
+          </a:lnRef>
+          <a:fillRef idx="0">
+            <a:schemeClr val="accent1"/>
+          </a:fillRef>
+          <a:effectRef idx="0">
+            <a:schemeClr val="accent1"/>
+          </a:effectRef>
+          <a:fontRef idx="minor">
+            <a:schemeClr val="tx1"/>
+          </a:fontRef>
+        </p:style>
+      </p:cxnSp>
+      <p:sp>
+        <p:nvSpPr>
+          <p:cNvPr id="18" name="Oval 17">
+            <a:extLst>
+              <a:ext uri="{FF2B5EF4-FFF2-40B4-BE49-F238E27FC236}">
+                <a16:creationId xmlns:a16="http://schemas.microsoft.com/office/drawing/2014/main" id="{FD94C02D-CA3B-A1CB-BDE6-420E0987075D}"/>
+              </a:ext>
+            </a:extLst>
+          </p:cNvPr>
+          <p:cNvSpPr/>
+          <p:nvPr/>
+        </p:nvSpPr>
+        <p:spPr>
+          <a:xfrm>
+            <a:off x="7925058" y="3320141"/>
+            <a:ext cx="1447801" cy="674914"/>
+          </a:xfrm>
+          <a:prstGeom prst="ellipse">
+            <a:avLst/>
+          </a:prstGeom>
+        </p:spPr>
+        <p:style>
+          <a:lnRef idx="2">
+            <a:schemeClr val="accent1">
+              <a:shade val="50000"/>
+            </a:schemeClr>
+          </a:lnRef>
+          <a:fillRef idx="1">
+            <a:schemeClr val="accent1"/>
+          </a:fillRef>
+          <a:effectRef idx="0">
+            <a:schemeClr val="accent1"/>
+          </a:effectRef>
+          <a:fontRef idx="minor">
+            <a:schemeClr val="lt1"/>
+          </a:fontRef>
+        </p:style>
+        <p:txBody>
+          <a:bodyPr rtlCol="0" anchor="ctr"/>
+          <a:lstStyle/>
+          <a:p>
+            <a:pPr algn="ctr"/>
+            <a:r>
+              <a:rPr lang="en-US" dirty="0"/>
+              <a:t>Node 3</a:t>
+            </a:r>
+          </a:p>
+          <a:p>
+            <a:pPr algn="ctr"/>
+            <a:r>
+              <a:rPr lang="en-US" dirty="0"/>
+              <a:t>MUL</a:t>
+            </a:r>
+          </a:p>
+        </p:txBody>
+      </p:sp>
+      <p:cxnSp>
+        <p:nvCxnSpPr>
+          <p:cNvPr id="19" name="Straight Arrow Connector 18">
+            <a:extLst>
+              <a:ext uri="{FF2B5EF4-FFF2-40B4-BE49-F238E27FC236}">
+                <a16:creationId xmlns:a16="http://schemas.microsoft.com/office/drawing/2014/main" id="{33083C7C-393F-CD69-83DE-0A5AE977D195}"/>
+              </a:ext>
+            </a:extLst>
+          </p:cNvPr>
+          <p:cNvCxnSpPr>
+            <a:cxnSpLocks/>
+            <a:stCxn id="18" idx="4"/>
+            <a:endCxn id="11" idx="6"/>
+          </p:cNvCxnSpPr>
+          <p:nvPr/>
+        </p:nvCxnSpPr>
+        <p:spPr>
+          <a:xfrm flipH="1">
+            <a:off x="7925058" y="3995055"/>
+            <a:ext cx="723901" cy="674923"/>
+          </a:xfrm>
+          <a:prstGeom prst="straightConnector1">
+            <a:avLst/>
+          </a:prstGeom>
+          <a:ln w="38100">
+            <a:tailEnd type="triangle"/>
+          </a:ln>
+        </p:spPr>
+        <p:style>
+          <a:lnRef idx="1">
+            <a:schemeClr val="accent1"/>
+          </a:lnRef>
+          <a:fillRef idx="0">
+            <a:schemeClr val="accent1"/>
+          </a:fillRef>
+          <a:effectRef idx="0">
+            <a:schemeClr val="accent1"/>
+          </a:effectRef>
+          <a:fontRef idx="minor">
+            <a:schemeClr val="tx1"/>
+          </a:fontRef>
+        </p:style>
+      </p:cxnSp>
+      <p:cxnSp>
+        <p:nvCxnSpPr>
+          <p:cNvPr id="21" name="Straight Arrow Connector 20">
+            <a:extLst>
+              <a:ext uri="{FF2B5EF4-FFF2-40B4-BE49-F238E27FC236}">
+                <a16:creationId xmlns:a16="http://schemas.microsoft.com/office/drawing/2014/main" id="{D60B34F1-E3A3-2978-6EDC-3511E972D828}"/>
+              </a:ext>
+            </a:extLst>
+          </p:cNvPr>
+          <p:cNvCxnSpPr>
+            <a:cxnSpLocks/>
+            <a:stCxn id="24" idx="2"/>
+          </p:cNvCxnSpPr>
+          <p:nvPr/>
+        </p:nvCxnSpPr>
+        <p:spPr>
+          <a:xfrm>
+            <a:off x="8312925" y="424540"/>
+            <a:ext cx="0" cy="2950020"/>
+          </a:xfrm>
+          <a:prstGeom prst="straightConnector1">
+            <a:avLst/>
+          </a:prstGeom>
+          <a:ln w="38100">
+            <a:tailEnd type="triangle"/>
+          </a:ln>
+        </p:spPr>
+        <p:style>
+          <a:lnRef idx="1">
+            <a:schemeClr val="accent1"/>
+          </a:lnRef>
+          <a:fillRef idx="0">
+            <a:schemeClr val="accent1"/>
+          </a:fillRef>
+          <a:effectRef idx="0">
+            <a:schemeClr val="accent1"/>
+          </a:effectRef>
+          <a:fontRef idx="minor">
+            <a:schemeClr val="tx1"/>
+          </a:fontRef>
+        </p:style>
+      </p:cxnSp>
+      <p:cxnSp>
+        <p:nvCxnSpPr>
+          <p:cNvPr id="23" name="Straight Arrow Connector 22">
+            <a:extLst>
+              <a:ext uri="{FF2B5EF4-FFF2-40B4-BE49-F238E27FC236}">
+                <a16:creationId xmlns:a16="http://schemas.microsoft.com/office/drawing/2014/main" id="{80AEFE51-A5AC-2658-A2C3-71A0B5207B5B}"/>
+              </a:ext>
+            </a:extLst>
+          </p:cNvPr>
+          <p:cNvCxnSpPr>
+            <a:cxnSpLocks/>
+            <a:stCxn id="25" idx="2"/>
+          </p:cNvCxnSpPr>
+          <p:nvPr/>
+        </p:nvCxnSpPr>
+        <p:spPr>
+          <a:xfrm>
+            <a:off x="8922320" y="424540"/>
+            <a:ext cx="0" cy="2928259"/>
+          </a:xfrm>
+          <a:prstGeom prst="straightConnector1">
+            <a:avLst/>
+          </a:prstGeom>
+          <a:ln w="38100">
+            <a:tailEnd type="triangle"/>
+          </a:ln>
+        </p:spPr>
+        <p:style>
+          <a:lnRef idx="1">
+            <a:schemeClr val="accent1"/>
+          </a:lnRef>
+          <a:fillRef idx="0">
+            <a:schemeClr val="accent1"/>
+          </a:fillRef>
+          <a:effectRef idx="0">
+            <a:schemeClr val="accent1"/>
+          </a:effectRef>
+          <a:fontRef idx="minor">
+            <a:schemeClr val="tx1"/>
+          </a:fontRef>
+        </p:style>
+      </p:cxnSp>
+      <p:sp>
+        <p:nvSpPr>
+          <p:cNvPr id="24" name="TextBox 23">
+            <a:extLst>
+              <a:ext uri="{FF2B5EF4-FFF2-40B4-BE49-F238E27FC236}">
+                <a16:creationId xmlns:a16="http://schemas.microsoft.com/office/drawing/2014/main" id="{C875C12C-8C95-5479-1D29-71FE4D197B79}"/>
+              </a:ext>
+            </a:extLst>
+          </p:cNvPr>
+          <p:cNvSpPr txBox="1"/>
+          <p:nvPr/>
+        </p:nvSpPr>
+        <p:spPr>
+          <a:xfrm>
+            <a:off x="8126816" y="55208"/>
+            <a:ext cx="372218" cy="369332"/>
+          </a:xfrm>
+          <a:prstGeom prst="rect">
+            <a:avLst/>
+          </a:prstGeom>
+          <a:noFill/>
+        </p:spPr>
+        <p:txBody>
+          <a:bodyPr wrap="none" rtlCol="0">
+            <a:spAutoFit/>
+          </a:bodyPr>
+          <a:lstStyle/>
+          <a:p>
+            <a:r>
+              <a:rPr lang="en-US" dirty="0"/>
+              <a:t>-1</a:t>
+            </a:r>
+          </a:p>
+        </p:txBody>
+      </p:sp>
+      <p:sp>
+        <p:nvSpPr>
+          <p:cNvPr id="25" name="TextBox 24">
+            <a:extLst>
+              <a:ext uri="{FF2B5EF4-FFF2-40B4-BE49-F238E27FC236}">
+                <a16:creationId xmlns:a16="http://schemas.microsoft.com/office/drawing/2014/main" id="{05C0D36A-8686-E932-A276-A5FF6DCB67A7}"/>
+              </a:ext>
+            </a:extLst>
+          </p:cNvPr>
+          <p:cNvSpPr txBox="1"/>
+          <p:nvPr/>
+        </p:nvSpPr>
+        <p:spPr>
+          <a:xfrm>
+            <a:off x="8769073" y="55208"/>
+            <a:ext cx="306494" cy="369332"/>
+          </a:xfrm>
+          <a:prstGeom prst="rect">
+            <a:avLst/>
+          </a:prstGeom>
+          <a:noFill/>
+        </p:spPr>
+        <p:txBody>
+          <a:bodyPr wrap="none" rtlCol="0">
+            <a:spAutoFit/>
+          </a:bodyPr>
+          <a:lstStyle/>
+          <a:p>
+            <a:r>
+              <a:rPr lang="en-US" dirty="0"/>
+              <a:t>b</a:t>
+            </a:r>
+          </a:p>
+        </p:txBody>
+      </p:sp>
+      <p:sp>
+        <p:nvSpPr>
+          <p:cNvPr id="26" name="Oval 25">
+            <a:extLst>
+              <a:ext uri="{FF2B5EF4-FFF2-40B4-BE49-F238E27FC236}">
+                <a16:creationId xmlns:a16="http://schemas.microsoft.com/office/drawing/2014/main" id="{B5AF0B2E-816C-5872-D6C4-C793E9002579}"/>
+              </a:ext>
+            </a:extLst>
+          </p:cNvPr>
+          <p:cNvSpPr/>
+          <p:nvPr/>
+        </p:nvSpPr>
+        <p:spPr>
+          <a:xfrm>
+            <a:off x="6141224" y="3352799"/>
+            <a:ext cx="1447801" cy="674914"/>
+          </a:xfrm>
+          <a:prstGeom prst="ellipse">
+            <a:avLst/>
+          </a:prstGeom>
+        </p:spPr>
+        <p:style>
+          <a:lnRef idx="2">
+            <a:schemeClr val="accent1">
+              <a:shade val="50000"/>
+            </a:schemeClr>
+          </a:lnRef>
+          <a:fillRef idx="1">
+            <a:schemeClr val="accent1"/>
+          </a:fillRef>
+          <a:effectRef idx="0">
+            <a:schemeClr val="accent1"/>
+          </a:effectRef>
+          <a:fontRef idx="minor">
+            <a:schemeClr val="lt1"/>
+          </a:fontRef>
+        </p:style>
+        <p:txBody>
+          <a:bodyPr rtlCol="0" anchor="ctr"/>
+          <a:lstStyle/>
+          <a:p>
+            <a:pPr algn="ctr"/>
+            <a:r>
+              <a:rPr lang="en-US" dirty="0"/>
+              <a:t>Node 5</a:t>
+            </a:r>
+          </a:p>
+          <a:p>
+            <a:pPr algn="ctr"/>
+            <a:r>
+              <a:rPr lang="en-US" dirty="0"/>
+              <a:t>SQR (1)</a:t>
+            </a:r>
+          </a:p>
+        </p:txBody>
+      </p:sp>
+      <p:cxnSp>
+        <p:nvCxnSpPr>
+          <p:cNvPr id="30" name="Straight Arrow Connector 29">
+            <a:extLst>
+              <a:ext uri="{FF2B5EF4-FFF2-40B4-BE49-F238E27FC236}">
+                <a16:creationId xmlns:a16="http://schemas.microsoft.com/office/drawing/2014/main" id="{D4C9BA8E-5078-3889-ED22-19F8C9878333}"/>
+              </a:ext>
+            </a:extLst>
+          </p:cNvPr>
+          <p:cNvCxnSpPr>
+            <a:cxnSpLocks/>
+            <a:endCxn id="11" idx="0"/>
+          </p:cNvCxnSpPr>
+          <p:nvPr/>
+        </p:nvCxnSpPr>
+        <p:spPr>
+          <a:xfrm>
+            <a:off x="6923629" y="4026853"/>
+            <a:ext cx="277529" cy="305668"/>
+          </a:xfrm>
+          <a:prstGeom prst="straightConnector1">
+            <a:avLst/>
+          </a:prstGeom>
+          <a:ln w="38100">
+            <a:tailEnd type="triangle"/>
+          </a:ln>
+        </p:spPr>
+        <p:style>
+          <a:lnRef idx="1">
+            <a:schemeClr val="accent1"/>
+          </a:lnRef>
+          <a:fillRef idx="0">
+            <a:schemeClr val="accent1"/>
+          </a:fillRef>
+          <a:effectRef idx="0">
+            <a:schemeClr val="accent1"/>
+          </a:effectRef>
+          <a:fontRef idx="minor">
+            <a:schemeClr val="tx1"/>
+          </a:fontRef>
+        </p:style>
+      </p:cxnSp>
+      <p:cxnSp>
+        <p:nvCxnSpPr>
+          <p:cNvPr id="32" name="Straight Arrow Connector 31">
+            <a:extLst>
+              <a:ext uri="{FF2B5EF4-FFF2-40B4-BE49-F238E27FC236}">
+                <a16:creationId xmlns:a16="http://schemas.microsoft.com/office/drawing/2014/main" id="{A58A97E3-025C-C08C-278F-932F8928AF4E}"/>
+              </a:ext>
+            </a:extLst>
+          </p:cNvPr>
+          <p:cNvCxnSpPr>
+            <a:cxnSpLocks/>
+            <a:stCxn id="33" idx="2"/>
+          </p:cNvCxnSpPr>
+          <p:nvPr/>
+        </p:nvCxnSpPr>
+        <p:spPr>
+          <a:xfrm>
+            <a:off x="7247663" y="424540"/>
+            <a:ext cx="3071" cy="2928259"/>
+          </a:xfrm>
+          <a:prstGeom prst="straightConnector1">
+            <a:avLst/>
+          </a:prstGeom>
+          <a:ln w="38100">
+            <a:tailEnd type="triangle"/>
+          </a:ln>
+        </p:spPr>
+        <p:style>
+          <a:lnRef idx="1">
+            <a:schemeClr val="accent1"/>
+          </a:lnRef>
+          <a:fillRef idx="0">
+            <a:schemeClr val="accent1"/>
+          </a:fillRef>
+          <a:effectRef idx="0">
+            <a:schemeClr val="accent1"/>
+          </a:effectRef>
+          <a:fontRef idx="minor">
+            <a:schemeClr val="tx1"/>
+          </a:fontRef>
+        </p:style>
+      </p:cxnSp>
+      <p:sp>
+        <p:nvSpPr>
+          <p:cNvPr id="33" name="TextBox 32">
+            <a:extLst>
+              <a:ext uri="{FF2B5EF4-FFF2-40B4-BE49-F238E27FC236}">
+                <a16:creationId xmlns:a16="http://schemas.microsoft.com/office/drawing/2014/main" id="{EFA2D80A-C5F7-687F-6354-991436426EFD}"/>
+              </a:ext>
+            </a:extLst>
+          </p:cNvPr>
+          <p:cNvSpPr txBox="1"/>
+          <p:nvPr/>
+        </p:nvSpPr>
+        <p:spPr>
+          <a:xfrm>
+            <a:off x="7096820" y="55208"/>
+            <a:ext cx="301686" cy="369332"/>
+          </a:xfrm>
+          <a:prstGeom prst="rect">
+            <a:avLst/>
+          </a:prstGeom>
+          <a:noFill/>
+        </p:spPr>
+        <p:txBody>
+          <a:bodyPr wrap="none" rtlCol="0">
+            <a:spAutoFit/>
+          </a:bodyPr>
+          <a:lstStyle/>
+          <a:p>
+            <a:r>
+              <a:rPr lang="en-US" dirty="0"/>
+              <a:t>1</a:t>
+            </a:r>
+          </a:p>
+        </p:txBody>
+      </p:sp>
+      <p:sp>
+        <p:nvSpPr>
+          <p:cNvPr id="34" name="Oval 33">
+            <a:extLst>
+              <a:ext uri="{FF2B5EF4-FFF2-40B4-BE49-F238E27FC236}">
+                <a16:creationId xmlns:a16="http://schemas.microsoft.com/office/drawing/2014/main" id="{667AEF38-36EC-9A1C-7533-40BE155ACFBC}"/>
+              </a:ext>
+            </a:extLst>
+          </p:cNvPr>
+          <p:cNvSpPr/>
+          <p:nvPr/>
+        </p:nvSpPr>
+        <p:spPr>
+          <a:xfrm>
+            <a:off x="4547333" y="2677885"/>
+            <a:ext cx="1447801" cy="674914"/>
+          </a:xfrm>
+          <a:prstGeom prst="ellipse">
+            <a:avLst/>
+          </a:prstGeom>
+        </p:spPr>
+        <p:style>
+          <a:lnRef idx="2">
+            <a:schemeClr val="accent1">
+              <a:shade val="50000"/>
+            </a:schemeClr>
+          </a:lnRef>
+          <a:fillRef idx="1">
+            <a:schemeClr val="accent1"/>
+          </a:fillRef>
+          <a:effectRef idx="0">
+            <a:schemeClr val="accent1"/>
+          </a:effectRef>
+          <a:fontRef idx="minor">
+            <a:schemeClr val="lt1"/>
+          </a:fontRef>
+        </p:style>
+        <p:txBody>
+          <a:bodyPr rtlCol="0" anchor="ctr"/>
+          <a:lstStyle/>
+          <a:p>
+            <a:pPr algn="ctr"/>
+            <a:r>
+              <a:rPr lang="en-US" dirty="0"/>
+              <a:t>Node 6</a:t>
+            </a:r>
+          </a:p>
+          <a:p>
+            <a:pPr algn="ctr"/>
+            <a:r>
+              <a:rPr lang="en-US" dirty="0"/>
+              <a:t>SUB</a:t>
+            </a:r>
+          </a:p>
+        </p:txBody>
+      </p:sp>
+      <p:cxnSp>
+        <p:nvCxnSpPr>
+          <p:cNvPr id="35" name="Straight Arrow Connector 34">
+            <a:extLst>
+              <a:ext uri="{FF2B5EF4-FFF2-40B4-BE49-F238E27FC236}">
+                <a16:creationId xmlns:a16="http://schemas.microsoft.com/office/drawing/2014/main" id="{4B5584D6-CD73-3B03-F2A2-FC0DBE748864}"/>
+              </a:ext>
+            </a:extLst>
+          </p:cNvPr>
+          <p:cNvCxnSpPr>
+            <a:cxnSpLocks/>
+            <a:stCxn id="34" idx="4"/>
+            <a:endCxn id="26" idx="2"/>
+          </p:cNvCxnSpPr>
+          <p:nvPr/>
+        </p:nvCxnSpPr>
+        <p:spPr>
+          <a:xfrm>
+            <a:off x="5271234" y="3352799"/>
+            <a:ext cx="869990" cy="337457"/>
+          </a:xfrm>
+          <a:prstGeom prst="straightConnector1">
+            <a:avLst/>
+          </a:prstGeom>
+          <a:ln w="38100">
+            <a:tailEnd type="triangle"/>
+          </a:ln>
+        </p:spPr>
+        <p:style>
+          <a:lnRef idx="1">
+            <a:schemeClr val="accent1"/>
+          </a:lnRef>
+          <a:fillRef idx="0">
+            <a:schemeClr val="accent1"/>
+          </a:fillRef>
+          <a:effectRef idx="0">
+            <a:schemeClr val="accent1"/>
+          </a:effectRef>
+          <a:fontRef idx="minor">
+            <a:schemeClr val="tx1"/>
+          </a:fontRef>
+        </p:style>
+      </p:cxnSp>
+      <p:sp>
+        <p:nvSpPr>
+          <p:cNvPr id="38" name="Oval 37">
+            <a:extLst>
+              <a:ext uri="{FF2B5EF4-FFF2-40B4-BE49-F238E27FC236}">
+                <a16:creationId xmlns:a16="http://schemas.microsoft.com/office/drawing/2014/main" id="{17A6898D-A82C-946F-F12B-E2F70A957243}"/>
+              </a:ext>
+            </a:extLst>
+          </p:cNvPr>
+          <p:cNvSpPr/>
+          <p:nvPr/>
+        </p:nvSpPr>
+        <p:spPr>
+          <a:xfrm>
+            <a:off x="3099532" y="1850567"/>
+            <a:ext cx="1447801" cy="674914"/>
+          </a:xfrm>
+          <a:prstGeom prst="ellipse">
+            <a:avLst/>
+          </a:prstGeom>
+        </p:spPr>
+        <p:style>
+          <a:lnRef idx="2">
+            <a:schemeClr val="accent1">
+              <a:shade val="50000"/>
+            </a:schemeClr>
+          </a:lnRef>
+          <a:fillRef idx="1">
+            <a:schemeClr val="accent1"/>
+          </a:fillRef>
+          <a:effectRef idx="0">
+            <a:schemeClr val="accent1"/>
+          </a:effectRef>
+          <a:fontRef idx="minor">
+            <a:schemeClr val="lt1"/>
+          </a:fontRef>
+        </p:style>
+        <p:txBody>
+          <a:bodyPr rtlCol="0" anchor="ctr"/>
+          <a:lstStyle/>
+          <a:p>
+            <a:pPr algn="ctr"/>
+            <a:r>
+              <a:rPr lang="en-US" dirty="0"/>
+              <a:t>Node 7</a:t>
+            </a:r>
+          </a:p>
+          <a:p>
+            <a:pPr algn="ctr"/>
+            <a:r>
+              <a:rPr lang="en-US" dirty="0"/>
+              <a:t>MUL (1)</a:t>
+            </a:r>
+          </a:p>
+        </p:txBody>
+      </p:sp>
+      <p:sp>
+        <p:nvSpPr>
+          <p:cNvPr id="39" name="Oval 38">
+            <a:extLst>
+              <a:ext uri="{FF2B5EF4-FFF2-40B4-BE49-F238E27FC236}">
+                <a16:creationId xmlns:a16="http://schemas.microsoft.com/office/drawing/2014/main" id="{64927684-9D2B-ACF3-B914-78CFA00B39EB}"/>
+              </a:ext>
+            </a:extLst>
+          </p:cNvPr>
+          <p:cNvSpPr/>
+          <p:nvPr/>
+        </p:nvSpPr>
+        <p:spPr>
+          <a:xfrm>
+            <a:off x="5606629" y="1850567"/>
+            <a:ext cx="1447801" cy="674914"/>
+          </a:xfrm>
+          <a:prstGeom prst="ellipse">
+            <a:avLst/>
+          </a:prstGeom>
+        </p:spPr>
+        <p:style>
+          <a:lnRef idx="2">
+            <a:schemeClr val="accent1">
+              <a:shade val="50000"/>
+            </a:schemeClr>
+          </a:lnRef>
+          <a:fillRef idx="1">
+            <a:schemeClr val="accent1"/>
+          </a:fillRef>
+          <a:effectRef idx="0">
+            <a:schemeClr val="accent1"/>
+          </a:effectRef>
+          <a:fontRef idx="minor">
+            <a:schemeClr val="lt1"/>
+          </a:fontRef>
+        </p:style>
+        <p:txBody>
+          <a:bodyPr rtlCol="0" anchor="ctr"/>
+          <a:lstStyle/>
+          <a:p>
+            <a:pPr algn="ctr"/>
+            <a:r>
+              <a:rPr lang="en-US" dirty="0"/>
+              <a:t>Node 8</a:t>
+            </a:r>
+          </a:p>
+          <a:p>
+            <a:pPr algn="ctr"/>
+            <a:r>
+              <a:rPr lang="en-US" dirty="0"/>
+              <a:t>MUL</a:t>
+            </a:r>
+          </a:p>
+        </p:txBody>
+      </p:sp>
+      <p:cxnSp>
+        <p:nvCxnSpPr>
+          <p:cNvPr id="40" name="Straight Arrow Connector 39">
+            <a:extLst>
+              <a:ext uri="{FF2B5EF4-FFF2-40B4-BE49-F238E27FC236}">
+                <a16:creationId xmlns:a16="http://schemas.microsoft.com/office/drawing/2014/main" id="{0C9FC61C-14E9-1793-B000-53341D4A1D88}"/>
+              </a:ext>
+            </a:extLst>
+          </p:cNvPr>
+          <p:cNvCxnSpPr>
+            <a:cxnSpLocks/>
+            <a:endCxn id="34" idx="1"/>
+          </p:cNvCxnSpPr>
+          <p:nvPr/>
+        </p:nvCxnSpPr>
+        <p:spPr>
+          <a:xfrm>
+            <a:off x="3823432" y="2525481"/>
+            <a:ext cx="935927" cy="251243"/>
+          </a:xfrm>
+          <a:prstGeom prst="straightConnector1">
+            <a:avLst/>
+          </a:prstGeom>
+          <a:ln w="38100">
+            <a:tailEnd type="triangle"/>
+          </a:ln>
+        </p:spPr>
+        <p:style>
+          <a:lnRef idx="1">
+            <a:schemeClr val="accent1"/>
+          </a:lnRef>
+          <a:fillRef idx="0">
+            <a:schemeClr val="accent1"/>
+          </a:fillRef>
+          <a:effectRef idx="0">
+            <a:schemeClr val="accent1"/>
+          </a:effectRef>
+          <a:fontRef idx="minor">
+            <a:schemeClr val="tx1"/>
+          </a:fontRef>
+        </p:style>
+      </p:cxnSp>
+      <p:cxnSp>
+        <p:nvCxnSpPr>
+          <p:cNvPr id="41" name="Straight Arrow Connector 40">
+            <a:extLst>
+              <a:ext uri="{FF2B5EF4-FFF2-40B4-BE49-F238E27FC236}">
+                <a16:creationId xmlns:a16="http://schemas.microsoft.com/office/drawing/2014/main" id="{549C3E62-D1FE-8769-F695-5340517F02D4}"/>
+              </a:ext>
+            </a:extLst>
+          </p:cNvPr>
+          <p:cNvCxnSpPr>
+            <a:cxnSpLocks/>
+            <a:endCxn id="34" idx="7"/>
+          </p:cNvCxnSpPr>
+          <p:nvPr/>
+        </p:nvCxnSpPr>
+        <p:spPr>
+          <a:xfrm flipH="1">
+            <a:off x="5783108" y="2563581"/>
+            <a:ext cx="554579" cy="213143"/>
+          </a:xfrm>
+          <a:prstGeom prst="straightConnector1">
+            <a:avLst/>
+          </a:prstGeom>
+          <a:ln w="38100">
+            <a:tailEnd type="triangle"/>
+          </a:ln>
+        </p:spPr>
+        <p:style>
+          <a:lnRef idx="1">
+            <a:schemeClr val="accent1"/>
+          </a:lnRef>
+          <a:fillRef idx="0">
+            <a:schemeClr val="accent1"/>
+          </a:fillRef>
+          <a:effectRef idx="0">
+            <a:schemeClr val="accent1"/>
+          </a:effectRef>
+          <a:fontRef idx="minor">
+            <a:schemeClr val="tx1"/>
+          </a:fontRef>
+        </p:style>
+      </p:cxnSp>
+      <p:sp>
+        <p:nvSpPr>
+          <p:cNvPr id="44" name="Oval 43">
+            <a:extLst>
+              <a:ext uri="{FF2B5EF4-FFF2-40B4-BE49-F238E27FC236}">
+                <a16:creationId xmlns:a16="http://schemas.microsoft.com/office/drawing/2014/main" id="{91D1F638-EFC4-0A59-B9CE-5FA73356DF8D}"/>
+              </a:ext>
+            </a:extLst>
+          </p:cNvPr>
+          <p:cNvSpPr/>
+          <p:nvPr/>
+        </p:nvSpPr>
+        <p:spPr>
+          <a:xfrm>
+            <a:off x="4562221" y="854521"/>
+            <a:ext cx="1447801" cy="674914"/>
+          </a:xfrm>
+          <a:prstGeom prst="ellipse">
+            <a:avLst/>
+          </a:prstGeom>
+        </p:spPr>
+        <p:style>
+          <a:lnRef idx="2">
+            <a:schemeClr val="accent1">
+              <a:shade val="50000"/>
+            </a:schemeClr>
+          </a:lnRef>
+          <a:fillRef idx="1">
+            <a:schemeClr val="accent1"/>
+          </a:fillRef>
+          <a:effectRef idx="0">
+            <a:schemeClr val="accent1"/>
+          </a:effectRef>
+          <a:fontRef idx="minor">
+            <a:schemeClr val="lt1"/>
+          </a:fontRef>
+        </p:style>
+        <p:txBody>
+          <a:bodyPr rtlCol="0" anchor="ctr"/>
+          <a:lstStyle/>
+          <a:p>
+            <a:pPr algn="ctr"/>
+            <a:r>
+              <a:rPr lang="en-US" dirty="0"/>
+              <a:t>Node 9</a:t>
+            </a:r>
+          </a:p>
+          <a:p>
+            <a:pPr algn="ctr"/>
+            <a:r>
+              <a:rPr lang="en-US" dirty="0"/>
+              <a:t>MUL</a:t>
+            </a:r>
+          </a:p>
+        </p:txBody>
+      </p:sp>
+      <p:cxnSp>
+        <p:nvCxnSpPr>
+          <p:cNvPr id="45" name="Straight Arrow Connector 44">
+            <a:extLst>
+              <a:ext uri="{FF2B5EF4-FFF2-40B4-BE49-F238E27FC236}">
+                <a16:creationId xmlns:a16="http://schemas.microsoft.com/office/drawing/2014/main" id="{F9CE8EE0-CF1F-CD64-0B5C-1D2AD622E5BF}"/>
+              </a:ext>
+            </a:extLst>
+          </p:cNvPr>
+          <p:cNvCxnSpPr>
+            <a:cxnSpLocks/>
+            <a:endCxn id="39" idx="1"/>
+          </p:cNvCxnSpPr>
+          <p:nvPr/>
+        </p:nvCxnSpPr>
+        <p:spPr>
+          <a:xfrm>
+            <a:off x="5315013" y="1529435"/>
+            <a:ext cx="503642" cy="419971"/>
+          </a:xfrm>
+          <a:prstGeom prst="straightConnector1">
+            <a:avLst/>
+          </a:prstGeom>
+          <a:ln w="38100">
+            <a:tailEnd type="triangle"/>
+          </a:ln>
+        </p:spPr>
+        <p:style>
+          <a:lnRef idx="1">
+            <a:schemeClr val="accent1"/>
+          </a:lnRef>
+          <a:fillRef idx="0">
+            <a:schemeClr val="accent1"/>
+          </a:fillRef>
+          <a:effectRef idx="0">
+            <a:schemeClr val="accent1"/>
+          </a:effectRef>
+          <a:fontRef idx="minor">
+            <a:schemeClr val="tx1"/>
+          </a:fontRef>
+        </p:style>
+      </p:cxnSp>
+      <p:sp>
+        <p:nvSpPr>
+          <p:cNvPr id="50" name="TextBox 49">
+            <a:extLst>
+              <a:ext uri="{FF2B5EF4-FFF2-40B4-BE49-F238E27FC236}">
+                <a16:creationId xmlns:a16="http://schemas.microsoft.com/office/drawing/2014/main" id="{1595CBBA-5BFC-2E56-F7CC-C22ACFE175F9}"/>
+              </a:ext>
+            </a:extLst>
+          </p:cNvPr>
+          <p:cNvSpPr txBox="1"/>
+          <p:nvPr/>
+        </p:nvSpPr>
+        <p:spPr>
+          <a:xfrm>
+            <a:off x="3099532" y="55208"/>
+            <a:ext cx="306494" cy="369332"/>
+          </a:xfrm>
+          <a:prstGeom prst="rect">
+            <a:avLst/>
+          </a:prstGeom>
+          <a:noFill/>
+        </p:spPr>
+        <p:txBody>
+          <a:bodyPr wrap="none" rtlCol="0">
+            <a:spAutoFit/>
+          </a:bodyPr>
+          <a:lstStyle/>
+          <a:p>
+            <a:r>
+              <a:rPr lang="en-US" dirty="0"/>
+              <a:t>b</a:t>
+            </a:r>
+          </a:p>
+        </p:txBody>
+      </p:sp>
+      <p:cxnSp>
+        <p:nvCxnSpPr>
+          <p:cNvPr id="51" name="Straight Arrow Connector 50">
+            <a:extLst>
+              <a:ext uri="{FF2B5EF4-FFF2-40B4-BE49-F238E27FC236}">
+                <a16:creationId xmlns:a16="http://schemas.microsoft.com/office/drawing/2014/main" id="{1740F413-0E5E-F1D3-BF69-4D2AED089573}"/>
+              </a:ext>
+            </a:extLst>
+          </p:cNvPr>
+          <p:cNvCxnSpPr>
+            <a:cxnSpLocks/>
+            <a:stCxn id="50" idx="2"/>
+            <a:endCxn id="38" idx="1"/>
+          </p:cNvCxnSpPr>
+          <p:nvPr/>
+        </p:nvCxnSpPr>
+        <p:spPr>
+          <a:xfrm>
+            <a:off x="3252779" y="424540"/>
+            <a:ext cx="58779" cy="1524866"/>
+          </a:xfrm>
+          <a:prstGeom prst="straightConnector1">
+            <a:avLst/>
+          </a:prstGeom>
+          <a:ln w="38100">
+            <a:tailEnd type="triangle"/>
+          </a:ln>
+        </p:spPr>
+        <p:style>
+          <a:lnRef idx="1">
+            <a:schemeClr val="accent1"/>
+          </a:lnRef>
+          <a:fillRef idx="0">
+            <a:schemeClr val="accent1"/>
+          </a:fillRef>
+          <a:effectRef idx="0">
+            <a:schemeClr val="accent1"/>
+          </a:effectRef>
+          <a:fontRef idx="minor">
+            <a:schemeClr val="tx1"/>
+          </a:fontRef>
+        </p:style>
+      </p:cxnSp>
+      <p:cxnSp>
+        <p:nvCxnSpPr>
+          <p:cNvPr id="53" name="Straight Arrow Connector 52">
+            <a:extLst>
+              <a:ext uri="{FF2B5EF4-FFF2-40B4-BE49-F238E27FC236}">
+                <a16:creationId xmlns:a16="http://schemas.microsoft.com/office/drawing/2014/main" id="{C423A3A0-13FE-5CC4-7F88-56CA8987BA13}"/>
+              </a:ext>
+            </a:extLst>
+          </p:cNvPr>
+          <p:cNvCxnSpPr>
+            <a:cxnSpLocks/>
+            <a:endCxn id="38" idx="7"/>
+          </p:cNvCxnSpPr>
+          <p:nvPr/>
+        </p:nvCxnSpPr>
+        <p:spPr>
+          <a:xfrm>
+            <a:off x="3438888" y="413659"/>
+            <a:ext cx="896419" cy="1535747"/>
+          </a:xfrm>
+          <a:prstGeom prst="straightConnector1">
+            <a:avLst/>
+          </a:prstGeom>
+          <a:ln w="38100">
+            <a:tailEnd type="triangle"/>
+          </a:ln>
+        </p:spPr>
+        <p:style>
+          <a:lnRef idx="1">
+            <a:schemeClr val="accent1"/>
+          </a:lnRef>
+          <a:fillRef idx="0">
+            <a:schemeClr val="accent1"/>
+          </a:fillRef>
+          <a:effectRef idx="0">
+            <a:schemeClr val="accent1"/>
+          </a:effectRef>
+          <a:fontRef idx="minor">
+            <a:schemeClr val="tx1"/>
+          </a:fontRef>
+        </p:style>
+      </p:cxnSp>
+      <p:sp>
+        <p:nvSpPr>
+          <p:cNvPr id="58" name="TextBox 57">
+            <a:extLst>
+              <a:ext uri="{FF2B5EF4-FFF2-40B4-BE49-F238E27FC236}">
+                <a16:creationId xmlns:a16="http://schemas.microsoft.com/office/drawing/2014/main" id="{5209E575-C986-89D8-1424-18FAB87962A4}"/>
+              </a:ext>
+            </a:extLst>
+          </p:cNvPr>
+          <p:cNvSpPr txBox="1"/>
+          <p:nvPr/>
+        </p:nvSpPr>
+        <p:spPr>
+          <a:xfrm>
+            <a:off x="4910370" y="55205"/>
+            <a:ext cx="306494" cy="369332"/>
+          </a:xfrm>
+          <a:prstGeom prst="rect">
+            <a:avLst/>
+          </a:prstGeom>
+          <a:noFill/>
+        </p:spPr>
+        <p:txBody>
+          <a:bodyPr wrap="none" rtlCol="0">
+            <a:spAutoFit/>
+          </a:bodyPr>
+          <a:lstStyle/>
+          <a:p>
+            <a:r>
+              <a:rPr lang="en-US" dirty="0"/>
+              <a:t>a</a:t>
+            </a:r>
+          </a:p>
+        </p:txBody>
+      </p:sp>
+      <p:sp>
+        <p:nvSpPr>
+          <p:cNvPr id="59" name="TextBox 58">
+            <a:extLst>
+              <a:ext uri="{FF2B5EF4-FFF2-40B4-BE49-F238E27FC236}">
+                <a16:creationId xmlns:a16="http://schemas.microsoft.com/office/drawing/2014/main" id="{6C7FE597-6627-C6B4-9D57-D3AD67655BC4}"/>
+              </a:ext>
+            </a:extLst>
+          </p:cNvPr>
+          <p:cNvSpPr txBox="1"/>
+          <p:nvPr/>
+        </p:nvSpPr>
+        <p:spPr>
+          <a:xfrm>
+            <a:off x="5443017" y="65694"/>
+            <a:ext cx="282450" cy="369332"/>
+          </a:xfrm>
+          <a:prstGeom prst="rect">
+            <a:avLst/>
+          </a:prstGeom>
+          <a:noFill/>
+        </p:spPr>
+        <p:txBody>
+          <a:bodyPr wrap="none" rtlCol="0">
+            <a:spAutoFit/>
+          </a:bodyPr>
+          <a:lstStyle/>
+          <a:p>
+            <a:r>
+              <a:rPr lang="en-US" dirty="0"/>
+              <a:t>c</a:t>
+            </a:r>
+          </a:p>
+        </p:txBody>
+      </p:sp>
+      <p:cxnSp>
+        <p:nvCxnSpPr>
+          <p:cNvPr id="60" name="Straight Arrow Connector 59">
+            <a:extLst>
+              <a:ext uri="{FF2B5EF4-FFF2-40B4-BE49-F238E27FC236}">
+                <a16:creationId xmlns:a16="http://schemas.microsoft.com/office/drawing/2014/main" id="{CEAE797B-CB77-E41F-948C-1CED67970648}"/>
+              </a:ext>
+            </a:extLst>
+          </p:cNvPr>
+          <p:cNvCxnSpPr>
+            <a:cxnSpLocks/>
+            <a:stCxn id="58" idx="2"/>
+            <a:endCxn id="44" idx="1"/>
+          </p:cNvCxnSpPr>
+          <p:nvPr/>
+        </p:nvCxnSpPr>
+        <p:spPr>
+          <a:xfrm flipH="1">
+            <a:off x="4774247" y="424537"/>
+            <a:ext cx="289370" cy="528823"/>
+          </a:xfrm>
+          <a:prstGeom prst="straightConnector1">
+            <a:avLst/>
+          </a:prstGeom>
+          <a:ln w="38100">
+            <a:tailEnd type="triangle"/>
+          </a:ln>
+        </p:spPr>
+        <p:style>
+          <a:lnRef idx="1">
+            <a:schemeClr val="accent1"/>
+          </a:lnRef>
+          <a:fillRef idx="0">
+            <a:schemeClr val="accent1"/>
+          </a:fillRef>
+          <a:effectRef idx="0">
+            <a:schemeClr val="accent1"/>
+          </a:effectRef>
+          <a:fontRef idx="minor">
+            <a:schemeClr val="tx1"/>
+          </a:fontRef>
+        </p:style>
+      </p:cxnSp>
+      <p:cxnSp>
+        <p:nvCxnSpPr>
+          <p:cNvPr id="63" name="Straight Arrow Connector 62">
+            <a:extLst>
+              <a:ext uri="{FF2B5EF4-FFF2-40B4-BE49-F238E27FC236}">
+                <a16:creationId xmlns:a16="http://schemas.microsoft.com/office/drawing/2014/main" id="{F9C282B8-ACE1-FEDE-2F05-7B28F66F883F}"/>
+              </a:ext>
+            </a:extLst>
+          </p:cNvPr>
+          <p:cNvCxnSpPr>
+            <a:cxnSpLocks/>
+            <a:stCxn id="59" idx="2"/>
+            <a:endCxn id="44" idx="7"/>
+          </p:cNvCxnSpPr>
+          <p:nvPr/>
+        </p:nvCxnSpPr>
+        <p:spPr>
+          <a:xfrm>
+            <a:off x="5584242" y="435026"/>
+            <a:ext cx="213754" cy="518334"/>
+          </a:xfrm>
+          <a:prstGeom prst="straightConnector1">
+            <a:avLst/>
+          </a:prstGeom>
+          <a:ln w="38100">
+            <a:tailEnd type="triangle"/>
+          </a:ln>
+        </p:spPr>
+        <p:style>
+          <a:lnRef idx="1">
+            <a:schemeClr val="accent1"/>
+          </a:lnRef>
+          <a:fillRef idx="0">
+            <a:schemeClr val="accent1"/>
+          </a:fillRef>
+          <a:effectRef idx="0">
+            <a:schemeClr val="accent1"/>
+          </a:effectRef>
+          <a:fontRef idx="minor">
+            <a:schemeClr val="tx1"/>
+          </a:fontRef>
+        </p:style>
+      </p:cxnSp>
+      <p:sp>
+        <p:nvSpPr>
+          <p:cNvPr id="68" name="TextBox 67">
+            <a:extLst>
+              <a:ext uri="{FF2B5EF4-FFF2-40B4-BE49-F238E27FC236}">
+                <a16:creationId xmlns:a16="http://schemas.microsoft.com/office/drawing/2014/main" id="{3A24AAFF-49B5-32BD-2F3E-DEB7B4088B15}"/>
+              </a:ext>
+            </a:extLst>
+          </p:cNvPr>
+          <p:cNvSpPr txBox="1"/>
+          <p:nvPr/>
+        </p:nvSpPr>
+        <p:spPr>
+          <a:xfrm>
+            <a:off x="522838" y="55205"/>
+            <a:ext cx="306494" cy="369332"/>
+          </a:xfrm>
+          <a:prstGeom prst="rect">
+            <a:avLst/>
+          </a:prstGeom>
+          <a:noFill/>
+        </p:spPr>
+        <p:txBody>
+          <a:bodyPr wrap="none" rtlCol="0">
+            <a:spAutoFit/>
+          </a:bodyPr>
+          <a:lstStyle/>
+          <a:p>
+            <a:r>
+              <a:rPr lang="en-US" dirty="0"/>
+              <a:t>a</a:t>
+            </a:r>
+          </a:p>
+        </p:txBody>
+      </p:sp>
+      <p:sp>
+        <p:nvSpPr>
+          <p:cNvPr id="69" name="TextBox 68">
+            <a:extLst>
+              <a:ext uri="{FF2B5EF4-FFF2-40B4-BE49-F238E27FC236}">
+                <a16:creationId xmlns:a16="http://schemas.microsoft.com/office/drawing/2014/main" id="{A0CC7D37-BBC5-7C01-C654-2D36E85DC45E}"/>
+              </a:ext>
+            </a:extLst>
+          </p:cNvPr>
+          <p:cNvSpPr txBox="1"/>
+          <p:nvPr/>
+        </p:nvSpPr>
+        <p:spPr>
+          <a:xfrm>
+            <a:off x="1208690" y="65694"/>
+            <a:ext cx="306494" cy="369332"/>
+          </a:xfrm>
+          <a:prstGeom prst="rect">
+            <a:avLst/>
+          </a:prstGeom>
+          <a:noFill/>
+        </p:spPr>
+        <p:txBody>
+          <a:bodyPr wrap="none" rtlCol="0">
+            <a:spAutoFit/>
+          </a:bodyPr>
+          <a:lstStyle/>
+          <a:p>
+            <a:r>
+              <a:rPr lang="en-US" dirty="0"/>
+              <a:t>2</a:t>
+            </a:r>
+          </a:p>
+        </p:txBody>
+      </p:sp>
+      <p:cxnSp>
+        <p:nvCxnSpPr>
+          <p:cNvPr id="70" name="Straight Arrow Connector 69">
+            <a:extLst>
+              <a:ext uri="{FF2B5EF4-FFF2-40B4-BE49-F238E27FC236}">
+                <a16:creationId xmlns:a16="http://schemas.microsoft.com/office/drawing/2014/main" id="{5ED87C93-90A7-68BB-996F-90D8C6D04CAE}"/>
+              </a:ext>
+            </a:extLst>
+          </p:cNvPr>
+          <p:cNvCxnSpPr>
+            <a:cxnSpLocks/>
+            <a:endCxn id="10" idx="1"/>
+          </p:cNvCxnSpPr>
+          <p:nvPr/>
+        </p:nvCxnSpPr>
+        <p:spPr>
+          <a:xfrm>
+            <a:off x="675410" y="424540"/>
+            <a:ext cx="385442" cy="4006820"/>
+          </a:xfrm>
+          <a:prstGeom prst="straightConnector1">
+            <a:avLst/>
+          </a:prstGeom>
+          <a:ln w="38100">
+            <a:tailEnd type="triangle"/>
+          </a:ln>
+        </p:spPr>
+        <p:style>
+          <a:lnRef idx="1">
+            <a:schemeClr val="accent1"/>
+          </a:lnRef>
+          <a:fillRef idx="0">
+            <a:schemeClr val="accent1"/>
+          </a:fillRef>
+          <a:effectRef idx="0">
+            <a:schemeClr val="accent1"/>
+          </a:effectRef>
+          <a:fontRef idx="minor">
+            <a:schemeClr val="tx1"/>
+          </a:fontRef>
+        </p:style>
+      </p:cxnSp>
+      <p:cxnSp>
+        <p:nvCxnSpPr>
+          <p:cNvPr id="72" name="Straight Arrow Connector 71">
+            <a:extLst>
+              <a:ext uri="{FF2B5EF4-FFF2-40B4-BE49-F238E27FC236}">
+                <a16:creationId xmlns:a16="http://schemas.microsoft.com/office/drawing/2014/main" id="{951C443B-C4AA-C7DE-9287-578A0DF73055}"/>
+              </a:ext>
+            </a:extLst>
+          </p:cNvPr>
+          <p:cNvCxnSpPr>
+            <a:cxnSpLocks/>
+            <a:endCxn id="10" idx="7"/>
+          </p:cNvCxnSpPr>
+          <p:nvPr/>
+        </p:nvCxnSpPr>
+        <p:spPr>
+          <a:xfrm>
+            <a:off x="1371124" y="380566"/>
+            <a:ext cx="713477" cy="4050794"/>
+          </a:xfrm>
+          <a:prstGeom prst="straightConnector1">
+            <a:avLst/>
+          </a:prstGeom>
+          <a:ln w="38100">
+            <a:tailEnd type="triangle"/>
+          </a:ln>
+        </p:spPr>
+        <p:style>
+          <a:lnRef idx="1">
+            <a:schemeClr val="accent1"/>
+          </a:lnRef>
+          <a:fillRef idx="0">
+            <a:schemeClr val="accent1"/>
+          </a:fillRef>
+          <a:effectRef idx="0">
+            <a:schemeClr val="accent1"/>
+          </a:effectRef>
+          <a:fontRef idx="minor">
+            <a:schemeClr val="tx1"/>
+          </a:fontRef>
+        </p:style>
+      </p:cxnSp>
+    </p:spTree>
+    <p:extLst>
+      <p:ext uri="{BB962C8B-B14F-4D97-AF65-F5344CB8AC3E}">
+        <p14:creationId xmlns:p14="http://schemas.microsoft.com/office/powerpoint/2010/main" val="232959403"/>
+      </p:ext>
+    </p:extLst>
+  </p:cSld>
+  <p:clrMapOvr>
+    <a:masterClrMapping/>
+  </p:clrMapOvr>
+</p:sld>
+</file>
+
 <file path=ppt/theme/theme1.xml><?xml version="1.0" encoding="utf-8"?>
 <a:theme xmlns:a="http://schemas.openxmlformats.org/drawingml/2006/main" name="Office Theme">
   <a:themeElements>

</xml_diff>